<commit_message>
updated PDF, Word, PPT files
</commit_message>
<xml_diff>
--- a/01/01_eloadas_internet_alapjai_tcp_ip.pptx
+++ b/01/01_eloadas_internet_alapjai_tcp_ip.pptx
@@ -3755,7 +3755,7 @@
           <a:p>
             <a:fld id="{4C482E4E-5CEC-44A9-BF2B-512FB3B5604F}" type="datetimeFigureOut">
               <a:rPr lang="en-US" smtClean="0"/>
-              <a:t>2/7/2026</a:t>
+              <a:t>2/15/2026</a:t>
             </a:fld>
             <a:endParaRPr lang="en-US"/>
           </a:p>
@@ -5429,6 +5429,10 @@
               <a:t>ms</a:t>
             </a:r>
             <a:r>
+              <a:rPr lang="hu-HU" dirty="0"/>
+              <a:t>-ot</a:t>
+            </a:r>
+            <a:r>
               <a:rPr lang="en-US" dirty="0"/>
               <a:t> </a:t>
             </a:r>
@@ -5454,11 +5458,11 @@
             </a:r>
             <a:r>
               <a:rPr lang="en-US" dirty="0"/>
-              <a:t> </a:t>
-            </a:r>
-            <a:r>
-              <a:rPr lang="en-US" dirty="0" err="1"/>
-              <a:t>lesz</a:t>
+              <a:t> le</a:t>
+            </a:r>
+            <a:r>
+              <a:rPr lang="hu-HU" dirty="0" err="1"/>
+              <a:t>het</a:t>
             </a:r>
             <a:r>
               <a:rPr lang="en-US" dirty="0"/>
@@ -7426,73 +7430,10 @@
               <a:rPr lang="en-US" dirty="0"/>
               <a:t>.</a:t>
             </a:r>
-            <a:br>
-              <a:rPr lang="en-US" dirty="0"/>
-            </a:br>
-            <a:r>
-              <a:rPr lang="en-US" dirty="0" err="1"/>
-              <a:t>Amikor</a:t>
-            </a:r>
-            <a:r>
-              <a:rPr lang="en-US" dirty="0"/>
-              <a:t> </a:t>
-            </a:r>
-            <a:r>
-              <a:rPr lang="en-US" dirty="0" err="1"/>
-              <a:t>beírsz</a:t>
-            </a:r>
-            <a:r>
-              <a:rPr lang="en-US" dirty="0"/>
-              <a:t> </a:t>
-            </a:r>
-            <a:r>
-              <a:rPr lang="en-US" dirty="0" err="1"/>
-              <a:t>egy</a:t>
-            </a:r>
-            <a:r>
-              <a:rPr lang="en-US" dirty="0"/>
-              <a:t> URL-t, </a:t>
-            </a:r>
-            <a:r>
-              <a:rPr lang="en-US" dirty="0" err="1"/>
-              <a:t>például</a:t>
-            </a:r>
-            <a:r>
-              <a:rPr lang="en-US" dirty="0"/>
-              <a:t> </a:t>
-            </a:r>
-            <a:r>
-              <a:rPr lang="en-US" sz="1200" kern="1200" dirty="0">
-                <a:solidFill>
-                  <a:schemeClr val="tx1"/>
-                </a:solidFill>
-                <a:latin typeface="+mn-lt"/>
-                <a:ea typeface="+mn-ea"/>
-                <a:cs typeface="+mn-cs"/>
-              </a:rPr>
-              <a:t>youtube.com</a:t>
-            </a:r>
-            <a:r>
-              <a:rPr lang="en-US" dirty="0"/>
-              <a:t>, a </a:t>
-            </a:r>
-            <a:r>
-              <a:rPr lang="en-US" dirty="0" err="1"/>
-              <a:t>következő</a:t>
-            </a:r>
-            <a:r>
-              <a:rPr lang="en-US" dirty="0"/>
-              <a:t> </a:t>
-            </a:r>
-            <a:r>
-              <a:rPr lang="en-US" dirty="0" err="1"/>
-              <a:t>történik</a:t>
-            </a:r>
-            <a:r>
-              <a:rPr lang="en-US" dirty="0"/>
-              <a:t>:</a:t>
-            </a:r>
-            <a:endParaRPr lang="hu-HU" dirty="0"/>
+            <a:r>
+              <a:rPr lang="hu-HU" dirty="0"/>
+              <a:t> A következő történik:</a:t>
+            </a:r>
           </a:p>
           <a:p>
             <a:endParaRPr lang="en-US" dirty="0"/>
@@ -7894,6 +7835,9 @@
               <a:rPr lang="en-US" dirty="0"/>
               <a:t>.</a:t>
             </a:r>
+          </a:p>
+          <a:p>
+            <a:endParaRPr lang="hu-HU" dirty="0"/>
           </a:p>
           <a:p>
             <a:r>
@@ -9897,7 +9841,7 @@
               <a:t> </a:t>
             </a:r>
             <a:r>
-              <a:rPr lang="en-US" dirty="0" err="1"/>
+              <a:rPr lang="hu-HU" dirty="0"/>
               <a:t>gépi</a:t>
             </a:r>
             <a:r>
@@ -10644,7 +10588,7 @@
             </a:r>
             <a:r>
               <a:rPr lang="hu-HU" dirty="0"/>
-              <a:t> továbbítja az adatokat. Tipikusan Ethernet keretek egy lokális hálózatban (LAN). De az Internet gerincén más fizikai hálózati protokollok és technológiák lehetnek. Ez transzparens a felette lévő rétegek számára.</a:t>
+              <a:t> továbbítja az adatokat. Tipikusan Ethernet keretek egy lokális hálózatban (LAN). De az Internet gerincén más fizikai hálózati hozzáférési protokollok és technológiák lehetnek. Ez transzparens a felette lévő rétegek számára.</a:t>
             </a:r>
             <a:endParaRPr lang="en-US" dirty="0"/>
           </a:p>
@@ -12031,39 +11975,7 @@
             </a:r>
             <a:r>
               <a:rPr lang="en-US" dirty="0"/>
-              <a:t> meg, </a:t>
-            </a:r>
-            <a:r>
-              <a:rPr lang="en-US" dirty="0" err="1"/>
-              <a:t>azonban</a:t>
-            </a:r>
-            <a:r>
-              <a:rPr lang="en-US" dirty="0"/>
-              <a:t> </a:t>
-            </a:r>
-            <a:r>
-              <a:rPr lang="en-US" dirty="0" err="1"/>
-              <a:t>csak</a:t>
-            </a:r>
-            <a:r>
-              <a:rPr lang="en-US" dirty="0"/>
-              <a:t> a </a:t>
-            </a:r>
-            <a:r>
-              <a:rPr lang="en-US" dirty="0" err="1"/>
-              <a:t>lokálisan</a:t>
-            </a:r>
-            <a:r>
-              <a:rPr lang="en-US" dirty="0"/>
-              <a:t> </a:t>
-            </a:r>
-            <a:r>
-              <a:rPr lang="en-US" dirty="0" err="1"/>
-              <a:t>értelmezendô</a:t>
-            </a:r>
-            <a:r>
-              <a:rPr lang="en-US" dirty="0"/>
-              <a:t>. </a:t>
+              <a:t> meg. </a:t>
             </a:r>
             <a:r>
               <a:rPr lang="en-US" dirty="0" err="1"/>
@@ -12433,14 +12345,6 @@
             </a:r>
             <a:r>
               <a:rPr lang="en-US" dirty="0" err="1"/>
-              <a:t>mező</a:t>
-            </a:r>
-            <a:r>
-              <a:rPr lang="en-US" dirty="0"/>
-              <a:t> </a:t>
-            </a:r>
-            <a:r>
-              <a:rPr lang="en-US" dirty="0" err="1"/>
               <a:t>egy</a:t>
             </a:r>
             <a:r>
@@ -13540,6 +13444,10 @@
             <a:r>
               <a:rPr lang="en-US" dirty="0" err="1"/>
               <a:t>vevô</a:t>
+            </a:r>
+            <a:r>
+              <a:rPr lang="hu-HU" dirty="0"/>
+              <a:t> (célállomás)</a:t>
             </a:r>
             <a:r>
               <a:rPr lang="en-US" dirty="0"/>
@@ -14688,7 +14596,7 @@
           <a:p>
             <a:fld id="{E80C50CD-E178-4744-9B35-B2F624D6C5E9}" type="datetimeFigureOut">
               <a:rPr lang="en-US" smtClean="0"/>
-              <a:t>2/7/2026</a:t>
+              <a:t>2/15/2026</a:t>
             </a:fld>
             <a:endParaRPr lang="en-US"/>
           </a:p>
@@ -14886,7 +14794,7 @@
           <a:p>
             <a:fld id="{E80C50CD-E178-4744-9B35-B2F624D6C5E9}" type="datetimeFigureOut">
               <a:rPr lang="en-US" smtClean="0"/>
-              <a:t>2/7/2026</a:t>
+              <a:t>2/15/2026</a:t>
             </a:fld>
             <a:endParaRPr lang="en-US"/>
           </a:p>
@@ -15094,7 +15002,7 @@
           <a:p>
             <a:fld id="{E80C50CD-E178-4744-9B35-B2F624D6C5E9}" type="datetimeFigureOut">
               <a:rPr lang="en-US" smtClean="0"/>
-              <a:t>2/7/2026</a:t>
+              <a:t>2/15/2026</a:t>
             </a:fld>
             <a:endParaRPr lang="en-US"/>
           </a:p>
@@ -15344,7 +15252,7 @@
           <a:p>
             <a:fld id="{E80C50CD-E178-4744-9B35-B2F624D6C5E9}" type="datetimeFigureOut">
               <a:rPr lang="en-US" smtClean="0"/>
-              <a:t>2/7/2026</a:t>
+              <a:t>2/15/2026</a:t>
             </a:fld>
             <a:endParaRPr lang="en-US"/>
           </a:p>
@@ -15623,7 +15531,7 @@
           <a:p>
             <a:fld id="{E80C50CD-E178-4744-9B35-B2F624D6C5E9}" type="datetimeFigureOut">
               <a:rPr lang="en-US" smtClean="0"/>
-              <a:t>2/7/2026</a:t>
+              <a:t>2/15/2026</a:t>
             </a:fld>
             <a:endParaRPr lang="en-US"/>
           </a:p>
@@ -15940,7 +15848,7 @@
           <a:p>
             <a:fld id="{E80C50CD-E178-4744-9B35-B2F624D6C5E9}" type="datetimeFigureOut">
               <a:rPr lang="en-US" smtClean="0"/>
-              <a:t>2/7/2026</a:t>
+              <a:t>2/15/2026</a:t>
             </a:fld>
             <a:endParaRPr lang="en-US"/>
           </a:p>
@@ -16356,7 +16264,7 @@
           <a:p>
             <a:fld id="{E80C50CD-E178-4744-9B35-B2F624D6C5E9}" type="datetimeFigureOut">
               <a:rPr lang="en-US" smtClean="0"/>
-              <a:t>2/7/2026</a:t>
+              <a:t>2/15/2026</a:t>
             </a:fld>
             <a:endParaRPr lang="en-US"/>
           </a:p>
@@ -16497,7 +16405,7 @@
           <a:p>
             <a:fld id="{E80C50CD-E178-4744-9B35-B2F624D6C5E9}" type="datetimeFigureOut">
               <a:rPr lang="en-US" smtClean="0"/>
-              <a:t>2/7/2026</a:t>
+              <a:t>2/15/2026</a:t>
             </a:fld>
             <a:endParaRPr lang="en-US"/>
           </a:p>
@@ -16610,7 +16518,7 @@
           <a:p>
             <a:fld id="{E80C50CD-E178-4744-9B35-B2F624D6C5E9}" type="datetimeFigureOut">
               <a:rPr lang="en-US" smtClean="0"/>
-              <a:t>2/7/2026</a:t>
+              <a:t>2/15/2026</a:t>
             </a:fld>
             <a:endParaRPr lang="en-US"/>
           </a:p>
@@ -16927,7 +16835,7 @@
           <a:p>
             <a:fld id="{E80C50CD-E178-4744-9B35-B2F624D6C5E9}" type="datetimeFigureOut">
               <a:rPr lang="en-US" smtClean="0"/>
-              <a:t>2/7/2026</a:t>
+              <a:t>2/15/2026</a:t>
             </a:fld>
             <a:endParaRPr lang="en-US"/>
           </a:p>
@@ -17219,7 +17127,7 @@
           <a:p>
             <a:fld id="{E80C50CD-E178-4744-9B35-B2F624D6C5E9}" type="datetimeFigureOut">
               <a:rPr lang="en-US" smtClean="0"/>
-              <a:t>2/7/2026</a:t>
+              <a:t>2/15/2026</a:t>
             </a:fld>
             <a:endParaRPr lang="en-US"/>
           </a:p>
@@ -17459,7 +17367,7 @@
             <a:fld id="{E80C50CD-E178-4744-9B35-B2F624D6C5E9}" type="datetimeFigureOut">
               <a:rPr lang="en-US" smtClean="0"/>
               <a:pPr/>
-              <a:t>2/7/2026</a:t>
+              <a:t>2/15/2026</a:t>
             </a:fld>
             <a:endParaRPr lang="en-US"/>
           </a:p>
@@ -19019,7 +18927,7 @@
                 <a:effectLst/>
                 <a:latin typeface="Arial" panose="020B0604020202020204" pitchFamily="34" charset="0"/>
               </a:rPr>
-              <a:t>Folyam-vezérlés</a:t>
+              <a:t>Folyamvezérlés</a:t>
             </a:r>
             <a:r>
               <a:rPr kumimoji="0" lang="hu-HU" altLang="en-US" b="0" i="0" u="none" strike="noStrike" cap="none" normalizeH="0" baseline="0" dirty="0">
@@ -27275,27 +27183,7 @@
                 <a:effectLst/>
                 <a:latin typeface="Arial" panose="020B0604020202020204" pitchFamily="34" charset="0"/>
               </a:rPr>
-              <a:t>, amelyekkel a </a:t>
-            </a:r>
-            <a:r>
-              <a:rPr kumimoji="0" lang="hu-HU" altLang="en-US" b="0" i="0" u="none" strike="noStrike" cap="none" normalizeH="0" baseline="0" dirty="0" err="1">
-                <a:ln>
-                  <a:noFill/>
-                </a:ln>
-                <a:effectLst/>
-                <a:latin typeface="Arial" panose="020B0604020202020204" pitchFamily="34" charset="0"/>
-              </a:rPr>
-              <a:t>a</a:t>
-            </a:r>
-            <a:r>
-              <a:rPr kumimoji="0" lang="hu-HU" altLang="en-US" b="0" i="0" u="none" strike="noStrike" cap="none" normalizeH="0" baseline="0" dirty="0">
-                <a:ln>
-                  <a:noFill/>
-                </a:ln>
-                <a:effectLst/>
-                <a:latin typeface="Arial" panose="020B0604020202020204" pitchFamily="34" charset="0"/>
-              </a:rPr>
-              <a:t> félév során megismerkedünk.</a:t>
+              <a:t>, amelyekkel a félév során megismerkedünk.</a:t>
             </a:r>
             <a:endParaRPr kumimoji="0" lang="en-US" altLang="en-US" b="0" i="0" u="none" strike="noStrike" cap="none" normalizeH="0" baseline="0" dirty="0">
               <a:ln>

</xml_diff>